<commit_message>
Final notebook and project with pdf copies
</commit_message>
<xml_diff>
--- a/Microsoft Presentation.pptx
+++ b/Microsoft Presentation.pptx
@@ -9266,7 +9266,7 @@
                   <a:srgbClr val="FF0000"/>
                 </a:solidFill>
               </a:rPr>
-              <a:t>A Historical data analysis on the movie industry </a:t>
+              <a:t>A historical data analysis on the movie industry </a:t>
             </a:r>
           </a:p>
           <a:p>
@@ -10380,7 +10380,7 @@
             </a:r>
             <a:r>
               <a:rPr lang="en-US" sz="2600" dirty="0"/>
-              <a:t> around </a:t>
+              <a:t> Between </a:t>
             </a:r>
             <a:r>
               <a:rPr lang="en-US" sz="2600" dirty="0">
@@ -10388,7 +10388,7 @@
                   <a:srgbClr val="FF0000"/>
                 </a:solidFill>
               </a:rPr>
-              <a:t>$5M </a:t>
+              <a:t>$10M-$25M </a:t>
             </a:r>
             <a:r>
               <a:rPr lang="en-US" sz="2600" dirty="0"/>
@@ -10404,7 +10404,7 @@
             </a:r>
             <a:r>
               <a:rPr lang="en-US" sz="2600" dirty="0"/>
-              <a:t> around </a:t>
+              <a:t> between </a:t>
             </a:r>
             <a:r>
               <a:rPr lang="en-US" sz="2600" dirty="0">
@@ -10412,7 +10412,7 @@
                   <a:srgbClr val="FF0000"/>
                 </a:solidFill>
               </a:rPr>
-              <a:t>$88M</a:t>
+              <a:t>$85M-$105M</a:t>
             </a:r>
           </a:p>
           <a:p>
@@ -10828,7 +10828,7 @@
         </p:nvSpPr>
         <p:spPr>
           <a:xfrm>
-            <a:off x="432000" y="2494085"/>
+            <a:off x="432000" y="4140005"/>
             <a:ext cx="7988100" cy="1468831"/>
           </a:xfrm>
           <a:prstGeom prst="rect">
@@ -10865,7 +10865,7 @@
             </a:pPr>
             <a:r>
               <a:rPr lang="en-US" sz="2600" dirty="0"/>
-              <a:t>Decide on </a:t>
+              <a:t>Identify top </a:t>
             </a:r>
             <a:r>
               <a:rPr lang="en-US" sz="2600" dirty="0">
@@ -10873,7 +10873,7 @@
                   <a:srgbClr val="FF0000"/>
                 </a:solidFill>
               </a:rPr>
-              <a:t>budget</a:t>
+              <a:t>directors</a:t>
             </a:r>
           </a:p>
           <a:p>
@@ -10886,7 +10886,7 @@
             </a:pPr>
             <a:r>
               <a:rPr lang="en-US" sz="2600" dirty="0"/>
-              <a:t>Identify top </a:t>
+              <a:t>Choose </a:t>
             </a:r>
             <a:r>
               <a:rPr lang="en-US" sz="2600" dirty="0">
@@ -10894,8 +10894,131 @@
                   <a:srgbClr val="FF0000"/>
                 </a:solidFill>
               </a:rPr>
-              <a:t>directors</a:t>
-            </a:r>
+              <a:t>different metric </a:t>
+            </a:r>
+            <a:r>
+              <a:rPr lang="en-US" sz="2600" dirty="0"/>
+              <a:t>for success such as total profit</a:t>
+            </a:r>
+          </a:p>
+          <a:p>
+            <a:endParaRPr lang="en-US" sz="2600" dirty="0"/>
+          </a:p>
+          <a:p>
+            <a:pPr marL="457200" indent="-457200">
+              <a:buFont typeface="Arial" panose="020B0604020202020204" pitchFamily="34" charset="0"/>
+              <a:buChar char="•"/>
+            </a:pPr>
+            <a:r>
+              <a:rPr lang="en-US" sz="2600" dirty="0"/>
+              <a:t>Exploring </a:t>
+            </a:r>
+            <a:r>
+              <a:rPr lang="en-US" sz="2600" dirty="0">
+                <a:solidFill>
+                  <a:srgbClr val="FF0000"/>
+                </a:solidFill>
+              </a:rPr>
+              <a:t>revenue beyond the box office</a:t>
+            </a:r>
+          </a:p>
+          <a:p>
+            <a:endParaRPr lang="en-US" sz="2600" dirty="0"/>
+          </a:p>
+          <a:p>
+            <a:pPr marL="457200" indent="-457200">
+              <a:buFont typeface="Arial" panose="020B0604020202020204" pitchFamily="34" charset="0"/>
+              <a:buChar char="•"/>
+            </a:pPr>
+            <a:r>
+              <a:rPr lang="en-US" sz="2600" dirty="0"/>
+              <a:t>Integrate </a:t>
+            </a:r>
+            <a:r>
+              <a:rPr lang="en-US" sz="2600" dirty="0">
+                <a:solidFill>
+                  <a:srgbClr val="FF0000"/>
+                </a:solidFill>
+              </a:rPr>
+              <a:t>popularity measures </a:t>
+            </a:r>
+            <a:r>
+              <a:rPr lang="en-US" sz="2600" dirty="0"/>
+              <a:t>(awards, social media etc.)</a:t>
+            </a:r>
+          </a:p>
+          <a:p>
+            <a:endParaRPr lang="en-US" sz="2600" dirty="0"/>
+          </a:p>
+          <a:p>
+            <a:pPr marL="457200" indent="-457200">
+              <a:buFont typeface="Arial" panose="020B0604020202020204" pitchFamily="34" charset="0"/>
+              <a:buChar char="•"/>
+            </a:pPr>
+            <a:r>
+              <a:rPr lang="en-US" sz="2600" dirty="0">
+                <a:solidFill>
+                  <a:srgbClr val="FF0000"/>
+                </a:solidFill>
+              </a:rPr>
+              <a:t>Acquisition</a:t>
+            </a:r>
+            <a:r>
+              <a:rPr lang="en-US" sz="2600" dirty="0"/>
+              <a:t> of successful movie </a:t>
+            </a:r>
+            <a:r>
+              <a:rPr lang="en-US" sz="2600" dirty="0">
+                <a:solidFill>
+                  <a:srgbClr val="FF0000"/>
+                </a:solidFill>
+              </a:rPr>
+              <a:t>studios</a:t>
+            </a:r>
+          </a:p>
+          <a:p>
+            <a:pPr marL="457200" indent="-457200">
+              <a:buFont typeface="Arial" panose="020B0604020202020204" pitchFamily="34" charset="0"/>
+              <a:buChar char="•"/>
+            </a:pPr>
+            <a:endParaRPr lang="en-US" sz="2600" dirty="0">
+              <a:solidFill>
+                <a:srgbClr val="FF0000"/>
+              </a:solidFill>
+            </a:endParaRPr>
+          </a:p>
+          <a:p>
+            <a:pPr marL="457200" indent="-457200">
+              <a:buFont typeface="Arial" panose="020B0604020202020204" pitchFamily="34" charset="0"/>
+              <a:buChar char="•"/>
+            </a:pPr>
+            <a:endParaRPr lang="en-US" sz="2600" dirty="0">
+              <a:solidFill>
+                <a:srgbClr val="FF0000"/>
+              </a:solidFill>
+            </a:endParaRPr>
+          </a:p>
+          <a:p>
+            <a:pPr marL="457200" indent="-457200">
+              <a:buFont typeface="Arial" panose="020B0604020202020204" pitchFamily="34" charset="0"/>
+              <a:buChar char="•"/>
+            </a:pPr>
+            <a:endParaRPr lang="en-US" sz="2600" dirty="0">
+              <a:solidFill>
+                <a:srgbClr val="FF0000"/>
+              </a:solidFill>
+            </a:endParaRPr>
+          </a:p>
+          <a:p>
+            <a:pPr marL="457200" indent="-457200">
+              <a:buFont typeface="Arial" panose="020B0604020202020204" pitchFamily="34" charset="0"/>
+              <a:buChar char="•"/>
+            </a:pPr>
+            <a:endParaRPr lang="en-US" sz="2600" dirty="0">
+              <a:solidFill>
+                <a:srgbClr val="FF0000"/>
+              </a:solidFill>
+            </a:endParaRPr>
           </a:p>
           <a:p>
             <a:endParaRPr lang="en-US" sz="2600" dirty="0">
@@ -11715,7 +11838,7 @@
                   <a:srgbClr val="FF0000"/>
                 </a:solidFill>
               </a:rPr>
-              <a:t>$5 and $10 million </a:t>
+              <a:t>$10 and $25 million </a:t>
             </a:r>
             <a:endParaRPr lang="en-US" sz="2600" dirty="0"/>
           </a:p>
@@ -13061,7 +13184,7 @@
                   <a:srgbClr val="FF0000"/>
                 </a:solidFill>
               </a:rPr>
-              <a:t>”successful” </a:t>
+              <a:t>”successful” Horror </a:t>
             </a:r>
             <a:r>
               <a:rPr lang="en-US" sz="2600" dirty="0"/>

</xml_diff>

<commit_message>
Made final tweak to presentation
</commit_message>
<xml_diff>
--- a/Microsoft Presentation.pptx
+++ b/Microsoft Presentation.pptx
@@ -227,7 +227,7 @@
           <a:p>
             <a:fld id="{EF1077DB-935E-4A0A-947A-D283B9F9F452}" type="datetimeFigureOut">
               <a:rPr lang="en-US" smtClean="0"/>
-              <a:t>3/17/21</a:t>
+              <a:t>3/20/21</a:t>
             </a:fld>
             <a:endParaRPr lang="en-US" dirty="0"/>
           </a:p>
@@ -404,7 +404,7 @@
           <a:p>
             <a:fld id="{2D9EC30E-1A71-4188-9BE7-E2A64929A436}" type="datetimeFigureOut">
               <a:rPr lang="en-US" noProof="0" smtClean="0"/>
-              <a:t>3/17/21</a:t>
+              <a:t>3/20/21</a:t>
             </a:fld>
             <a:endParaRPr lang="en-US" noProof="0"/>
           </a:p>
@@ -9833,7 +9833,7 @@
         </p:nvSpPr>
         <p:spPr>
           <a:xfrm>
-            <a:off x="9554595" y="1266732"/>
+            <a:off x="9357248" y="1266732"/>
             <a:ext cx="1752403" cy="1631216"/>
           </a:xfrm>
           <a:prstGeom prst="rect">
@@ -9876,7 +9876,7 @@
         </p:nvSpPr>
         <p:spPr>
           <a:xfrm>
-            <a:off x="9681965" y="2567833"/>
+            <a:off x="9357248" y="2567833"/>
             <a:ext cx="2043955" cy="646331"/>
           </a:xfrm>
           <a:prstGeom prst="rect">
@@ -10245,7 +10245,7 @@
         </p:nvSpPr>
         <p:spPr>
           <a:xfrm>
-            <a:off x="432000" y="2494085"/>
+            <a:off x="432000" y="2694584"/>
             <a:ext cx="7988100" cy="1468831"/>
           </a:xfrm>
           <a:prstGeom prst="rect">
@@ -10828,7 +10828,7 @@
         </p:nvSpPr>
         <p:spPr>
           <a:xfrm>
-            <a:off x="432000" y="4140005"/>
+            <a:off x="432000" y="3429000"/>
             <a:ext cx="7988100" cy="1468831"/>
           </a:xfrm>
           <a:prstGeom prst="rect">
@@ -16501,12 +16501,11 @@
 </file>
 
 <file path=customXml/item1.xml><?xml version="1.0" encoding="utf-8"?>
-<?mso-contentType ?>
-<FormTemplates xmlns="http://schemas.microsoft.com/sharepoint/v3/contenttype/forms">
-  <Display>DocumentLibraryForm</Display>
-  <Edit>DocumentLibraryForm</Edit>
-  <New>DocumentLibraryForm</New>
-</FormTemplates>
+<p:properties xmlns:p="http://schemas.microsoft.com/office/2006/metadata/properties" xmlns:xsi="http://www.w3.org/2001/XMLSchema-instance" xmlns:pc="http://schemas.microsoft.com/office/infopath/2007/PartnerControls">
+  <documentManagement>
+    <MediaServiceKeyPoints xmlns="71af3243-3dd4-4a8d-8c0d-dd76da1f02a5" xsi:nil="true"/>
+  </documentManagement>
+</p:properties>
 </file>
 
 <file path=customXml/item2.xml><?xml version="1.0" encoding="utf-8"?>
@@ -16721,17 +16720,20 @@
 </file>
 
 <file path=customXml/item3.xml><?xml version="1.0" encoding="utf-8"?>
-<p:properties xmlns:p="http://schemas.microsoft.com/office/2006/metadata/properties" xmlns:xsi="http://www.w3.org/2001/XMLSchema-instance" xmlns:pc="http://schemas.microsoft.com/office/infopath/2007/PartnerControls">
-  <documentManagement>
-    <MediaServiceKeyPoints xmlns="71af3243-3dd4-4a8d-8c0d-dd76da1f02a5" xsi:nil="true"/>
-  </documentManagement>
-</p:properties>
+<?mso-contentType ?>
+<FormTemplates xmlns="http://schemas.microsoft.com/sharepoint/v3/contenttype/forms">
+  <Display>DocumentLibraryForm</Display>
+  <Edit>DocumentLibraryForm</Edit>
+  <New>DocumentLibraryForm</New>
+</FormTemplates>
 </file>
 
 <file path=customXml/itemProps1.xml><?xml version="1.0" encoding="utf-8"?>
-<ds:datastoreItem xmlns:ds="http://schemas.openxmlformats.org/officeDocument/2006/customXml" ds:itemID="{47323504-CBC8-4A2F-BF86-8DF0D94D4A3D}">
+<ds:datastoreItem xmlns:ds="http://schemas.openxmlformats.org/officeDocument/2006/customXml" ds:itemID="{96100F67-BC3D-46B4-8D39-802DC9D7F2EB}">
   <ds:schemaRefs>
-    <ds:schemaRef ds:uri="http://schemas.microsoft.com/sharepoint/v3/contenttype/forms"/>
+    <ds:schemaRef ds:uri="http://schemas.microsoft.com/office/2006/metadata/properties"/>
+    <ds:schemaRef ds:uri="http://schemas.microsoft.com/office/infopath/2007/PartnerControls"/>
+    <ds:schemaRef ds:uri="71af3243-3dd4-4a8d-8c0d-dd76da1f02a5"/>
   </ds:schemaRefs>
 </ds:datastoreItem>
 </file>
@@ -16756,11 +16758,9 @@
 </file>
 
 <file path=customXml/itemProps3.xml><?xml version="1.0" encoding="utf-8"?>
-<ds:datastoreItem xmlns:ds="http://schemas.openxmlformats.org/officeDocument/2006/customXml" ds:itemID="{96100F67-BC3D-46B4-8D39-802DC9D7F2EB}">
+<ds:datastoreItem xmlns:ds="http://schemas.openxmlformats.org/officeDocument/2006/customXml" ds:itemID="{47323504-CBC8-4A2F-BF86-8DF0D94D4A3D}">
   <ds:schemaRefs>
-    <ds:schemaRef ds:uri="http://schemas.microsoft.com/office/2006/metadata/properties"/>
-    <ds:schemaRef ds:uri="http://schemas.microsoft.com/office/infopath/2007/PartnerControls"/>
-    <ds:schemaRef ds:uri="71af3243-3dd4-4a8d-8c0d-dd76da1f02a5"/>
+    <ds:schemaRef ds:uri="http://schemas.microsoft.com/sharepoint/v3/contenttype/forms"/>
   </ds:schemaRefs>
 </ds:datastoreItem>
 </file>
</xml_diff>

<commit_message>
Added risk matrix analysis
</commit_message>
<xml_diff>
--- a/Microsoft Presentation.pptx
+++ b/Microsoft Presentation.pptx
@@ -227,7 +227,7 @@
           <a:p>
             <a:fld id="{EF1077DB-935E-4A0A-947A-D283B9F9F452}" type="datetimeFigureOut">
               <a:rPr lang="en-US" smtClean="0"/>
-              <a:t>3/20/21</a:t>
+              <a:t>3/21/21</a:t>
             </a:fld>
             <a:endParaRPr lang="en-US" dirty="0"/>
           </a:p>
@@ -404,7 +404,7 @@
           <a:p>
             <a:fld id="{2D9EC30E-1A71-4188-9BE7-E2A64929A436}" type="datetimeFigureOut">
               <a:rPr lang="en-US" noProof="0" smtClean="0"/>
-              <a:t>3/20/21</a:t>
+              <a:t>3/21/21</a:t>
             </a:fld>
             <a:endParaRPr lang="en-US" noProof="0"/>
           </a:p>
@@ -16501,14 +16501,6 @@
 </file>
 
 <file path=customXml/item1.xml><?xml version="1.0" encoding="utf-8"?>
-<p:properties xmlns:p="http://schemas.microsoft.com/office/2006/metadata/properties" xmlns:xsi="http://www.w3.org/2001/XMLSchema-instance" xmlns:pc="http://schemas.microsoft.com/office/infopath/2007/PartnerControls">
-  <documentManagement>
-    <MediaServiceKeyPoints xmlns="71af3243-3dd4-4a8d-8c0d-dd76da1f02a5" xsi:nil="true"/>
-  </documentManagement>
-</p:properties>
-</file>
-
-<file path=customXml/item2.xml><?xml version="1.0" encoding="utf-8"?>
 <ct:contentTypeSchema xmlns:ct="http://schemas.microsoft.com/office/2006/metadata/contentType" xmlns:ma="http://schemas.microsoft.com/office/2006/metadata/properties/metaAttributes" ct:_="" ma:_="" ma:contentTypeName="Document" ma:contentTypeID="0x01010079F111ED35F8CC479449609E8A0923A6" ma:contentTypeVersion="11" ma:contentTypeDescription="Create a new document." ma:contentTypeScope="" ma:versionID="9677210f24a1be23c92c90fd886aa0aa">
   <xsd:schema xmlns:xsd="http://www.w3.org/2001/XMLSchema" xmlns:xs="http://www.w3.org/2001/XMLSchema" xmlns:p="http://schemas.microsoft.com/office/2006/metadata/properties" xmlns:ns2="71af3243-3dd4-4a8d-8c0d-dd76da1f02a5" xmlns:ns3="16c05727-aa75-4e4a-9b5f-8a80a1165891" targetNamespace="http://schemas.microsoft.com/office/2006/metadata/properties" ma:root="true" ma:fieldsID="60e05723c5c1908df1a1a4ebf11d344e" ns2:_="" ns3:_="">
     <xsd:import namespace="71af3243-3dd4-4a8d-8c0d-dd76da1f02a5"/>
@@ -16719,6 +16711,14 @@
 </ct:contentTypeSchema>
 </file>
 
+<file path=customXml/item2.xml><?xml version="1.0" encoding="utf-8"?>
+<p:properties xmlns:p="http://schemas.microsoft.com/office/2006/metadata/properties" xmlns:xsi="http://www.w3.org/2001/XMLSchema-instance" xmlns:pc="http://schemas.microsoft.com/office/infopath/2007/PartnerControls">
+  <documentManagement>
+    <MediaServiceKeyPoints xmlns="71af3243-3dd4-4a8d-8c0d-dd76da1f02a5" xsi:nil="true"/>
+  </documentManagement>
+</p:properties>
+</file>
+
 <file path=customXml/item3.xml><?xml version="1.0" encoding="utf-8"?>
 <?mso-contentType ?>
 <FormTemplates xmlns="http://schemas.microsoft.com/sharepoint/v3/contenttype/forms">
@@ -16729,16 +16729,6 @@
 </file>
 
 <file path=customXml/itemProps1.xml><?xml version="1.0" encoding="utf-8"?>
-<ds:datastoreItem xmlns:ds="http://schemas.openxmlformats.org/officeDocument/2006/customXml" ds:itemID="{96100F67-BC3D-46B4-8D39-802DC9D7F2EB}">
-  <ds:schemaRefs>
-    <ds:schemaRef ds:uri="http://schemas.microsoft.com/office/2006/metadata/properties"/>
-    <ds:schemaRef ds:uri="http://schemas.microsoft.com/office/infopath/2007/PartnerControls"/>
-    <ds:schemaRef ds:uri="71af3243-3dd4-4a8d-8c0d-dd76da1f02a5"/>
-  </ds:schemaRefs>
-</ds:datastoreItem>
-</file>
-
-<file path=customXml/itemProps2.xml><?xml version="1.0" encoding="utf-8"?>
 <ds:datastoreItem xmlns:ds="http://schemas.openxmlformats.org/officeDocument/2006/customXml" ds:itemID="{853D8350-BC36-420E-83B3-2CFFF4E97F6D}">
   <ds:schemaRefs>
     <ds:schemaRef ds:uri="http://schemas.microsoft.com/office/2006/metadata/contentType"/>
@@ -16757,6 +16747,16 @@
 </ds:datastoreItem>
 </file>
 
+<file path=customXml/itemProps2.xml><?xml version="1.0" encoding="utf-8"?>
+<ds:datastoreItem xmlns:ds="http://schemas.openxmlformats.org/officeDocument/2006/customXml" ds:itemID="{96100F67-BC3D-46B4-8D39-802DC9D7F2EB}">
+  <ds:schemaRefs>
+    <ds:schemaRef ds:uri="http://schemas.microsoft.com/office/2006/metadata/properties"/>
+    <ds:schemaRef ds:uri="http://schemas.microsoft.com/office/infopath/2007/PartnerControls"/>
+    <ds:schemaRef ds:uri="71af3243-3dd4-4a8d-8c0d-dd76da1f02a5"/>
+  </ds:schemaRefs>
+</ds:datastoreItem>
+</file>
+
 <file path=customXml/itemProps3.xml><?xml version="1.0" encoding="utf-8"?>
 <ds:datastoreItem xmlns:ds="http://schemas.openxmlformats.org/officeDocument/2006/customXml" ds:itemID="{47323504-CBC8-4A2F-BF86-8DF0D94D4A3D}">
   <ds:schemaRefs>

</xml_diff>